<commit_message>
Deploying to gh-pages from @ matsu2254/study@5df585e2821a0ab556a48bef86e020ca7f6ab078 🚀
</commit_message>
<xml_diff>
--- a/docs/20240112_pandas_nyumon.pptx
+++ b/docs/20240112_pandas_nyumon.pptx
@@ -27,9 +27,11 @@
     <p:sldId id="275" r:id="rId21"/>
     <p:sldId id="276" r:id="rId22"/>
     <p:sldId id="277" r:id="rId23"/>
+    <p:sldId id="278" r:id="rId24"/>
+    <p:sldId id="279" r:id="rId25"/>
   </p:sldIdLst>
   <p:notesMasterIdLst>
-    <p:notesMasterId r:id="rId24"/>
+    <p:notesMasterId r:id="rId26"/>
   </p:notesMasterIdLst>
   <p:sldSz cx="12192000" cy="6858000"/>
   <p:notesSz cx="6858000" cy="12192000"/>
@@ -523,7 +525,11 @@
           <a:p>
             <a:r>
               <a:rPr lang="en-US" dirty="0"/>
-              <a:t/>
+              <a:t>「ふわっと学ぶ　Pandas入門」と題してお話させていただきます。
+なぜふわっとかと言えば、教科書てきに教えられて身につくようなものではないので、
+「ふわっとさらっと、Pandas 怖くないよ！」
+って伝えられればと思います。
+まぁあとでゴリゴリ演習があるのですが…</a:t>
             </a:r>
             <a:endParaRPr lang="en-US" dirty="0"/>
           </a:p>
@@ -611,7 +617,7 @@
           <a:p>
             <a:r>
               <a:rPr lang="en-US" dirty="0"/>
-              <a:t/>
+              <a:t>列だけ切り取っても、添字がついてきてくれます。</a:t>
             </a:r>
             <a:endParaRPr lang="en-US" dirty="0"/>
           </a:p>
@@ -787,7 +793,8 @@
           <a:p>
             <a:r>
               <a:rPr lang="en-US" dirty="0"/>
-              <a:t/>
+              <a:t>基本的かつありがちな関数としてSUMを考えてみます。
+A列の値すべてを選択肢、足し合わせているのだから、書き方の差異こそあれどそのままです。</a:t>
             </a:r>
             <a:endParaRPr lang="en-US" dirty="0"/>
           </a:p>
@@ -1051,7 +1058,10 @@
           <a:p>
             <a:r>
               <a:rPr lang="en-US" dirty="0"/>
-              <a:t/>
+              <a:t>pandasでよく使う操作として、以上のようなものがあります。
+まだまだあります…
+正直すべて覚えるのはつらいです。
+なので適当にリファレンス的なものを参照しましょう。</a:t>
             </a:r>
             <a:endParaRPr lang="en-US" dirty="0"/>
           </a:p>
@@ -1315,7 +1325,7 @@
           <a:p>
             <a:r>
               <a:rPr lang="en-US" dirty="0"/>
-              <a:t/>
+              <a:t>習うより慣れろ、脳筋演習タイムです</a:t>
             </a:r>
             <a:endParaRPr lang="en-US" dirty="0"/>
           </a:p>
@@ -1491,7 +1501,8 @@
           <a:p>
             <a:r>
               <a:rPr lang="en-US" dirty="0"/>
-              <a:t/>
+              <a:t>pandasは、Pythonにおいて、データ解析を支援する機能を提供するライブラリである。特に、数表および時系列データを操作するためのデータ構造と演算を提供〜云々…
+ん〜と、つまるところこれです</a:t>
             </a:r>
             <a:endParaRPr lang="en-US" dirty="0"/>
           </a:p>
@@ -1797,7 +1808,7 @@
 </p:notes>
 </file>
 
-<file path=ppt/notesSlides/notesSlide3.xml><?xml version="1.0" encoding="utf-8"?>
+<file path=ppt/notesSlides/notesSlide23.xml><?xml version="1.0" encoding="utf-8"?>
 <p:notes xmlns:a="http://schemas.openxmlformats.org/drawingml/2006/main" xmlns:r="http://schemas.openxmlformats.org/officeDocument/2006/relationships" xmlns:p="http://schemas.openxmlformats.org/presentationml/2006/main">
   <p:cSld>
     <p:spTree>
@@ -1866,7 +1877,7 @@
           <a:p>
             <a:fld id="{F7021451-1387-4CA6-816F-3879F97B5CBC}" type="slidenum">
               <a:rPr lang="en-US"/>
-              <a:t>3</a:t>
+              <a:t>23</a:t>
             </a:fld>
             <a:endParaRPr lang="en-US"/>
           </a:p>
@@ -1885,7 +1896,7 @@
 </p:notes>
 </file>
 
-<file path=ppt/notesSlides/notesSlide4.xml><?xml version="1.0" encoding="utf-8"?>
+<file path=ppt/notesSlides/notesSlide24.xml><?xml version="1.0" encoding="utf-8"?>
 <p:notes xmlns:a="http://schemas.openxmlformats.org/drawingml/2006/main" xmlns:r="http://schemas.openxmlformats.org/officeDocument/2006/relationships" xmlns:p="http://schemas.openxmlformats.org/presentationml/2006/main">
   <p:cSld>
     <p:spTree>
@@ -1954,7 +1965,7 @@
           <a:p>
             <a:fld id="{F7021451-1387-4CA6-816F-3879F97B5CBC}" type="slidenum">
               <a:rPr lang="en-US"/>
-              <a:t>4</a:t>
+              <a:t>24</a:t>
             </a:fld>
             <a:endParaRPr lang="en-US"/>
           </a:p>
@@ -1973,7 +1984,95 @@
 </p:notes>
 </file>
 
-<file path=ppt/notesSlides/notesSlide5.xml><?xml version="1.0" encoding="utf-8"?>
+<file path=ppt/notesSlides/notesSlide3.xml><?xml version="1.0" encoding="utf-8"?>
+<p:notes xmlns:a="http://schemas.openxmlformats.org/drawingml/2006/main" xmlns:r="http://schemas.openxmlformats.org/officeDocument/2006/relationships" xmlns:p="http://schemas.openxmlformats.org/presentationml/2006/main">
+  <p:cSld>
+    <p:spTree>
+      <p:nvGrpSpPr>
+        <p:cNvPr id="1" name=""/>
+        <p:cNvGrpSpPr/>
+        <p:nvPr/>
+      </p:nvGrpSpPr>
+      <p:grpSpPr>
+        <a:xfrm>
+          <a:off x="0" y="0"/>
+          <a:ext cx="0" cy="0"/>
+          <a:chOff x="0" y="0"/>
+          <a:chExt cx="0" cy="0"/>
+        </a:xfrm>
+      </p:grpSpPr>
+      <p:sp>
+        <p:nvSpPr>
+          <p:cNvPr id="2" name="Slide Image Placeholder 1"/>
+          <p:cNvSpPr>
+            <a:spLocks noGrp="1" noRot="1" noChangeAspect="1"/>
+          </p:cNvSpPr>
+          <p:nvPr>
+            <p:ph type="sldImg"/>
+          </p:nvPr>
+        </p:nvSpPr>
+        <p:spPr/>
+      </p:sp>
+      <p:sp>
+        <p:nvSpPr>
+          <p:cNvPr id="3" name="Notes Placeholder 2"/>
+          <p:cNvSpPr>
+            <a:spLocks noGrp="1"/>
+          </p:cNvSpPr>
+          <p:nvPr>
+            <p:ph type="body" idx="1"/>
+          </p:nvPr>
+        </p:nvSpPr>
+        <p:spPr/>
+        <p:txBody>
+          <a:bodyPr/>
+          <a:lstStyle/>
+          <a:p>
+            <a:r>
+              <a:rPr lang="en-US" dirty="0"/>
+              <a:t>これが今回いちばん言いたいこと</a:t>
+            </a:r>
+            <a:endParaRPr lang="en-US" dirty="0"/>
+          </a:p>
+        </p:txBody>
+      </p:sp>
+      <p:sp>
+        <p:nvSpPr>
+          <p:cNvPr id="4" name="Slide Number Placeholder 3"/>
+          <p:cNvSpPr>
+            <a:spLocks noGrp="1"/>
+          </p:cNvSpPr>
+          <p:nvPr>
+            <p:ph type="sldNum" sz="quarter" idx="10"/>
+          </p:nvPr>
+        </p:nvSpPr>
+        <p:spPr/>
+        <p:txBody>
+          <a:bodyPr/>
+          <a:lstStyle/>
+          <a:p>
+            <a:fld id="{F7021451-1387-4CA6-816F-3879F97B5CBC}" type="slidenum">
+              <a:rPr lang="en-US"/>
+              <a:t>3</a:t>
+            </a:fld>
+            <a:endParaRPr lang="en-US"/>
+          </a:p>
+        </p:txBody>
+      </p:sp>
+    </p:spTree>
+    <p:extLst>
+      <p:ext uri="{BB962C8B-B14F-4D97-AF65-F5344CB8AC3E}">
+        <p14:creationId xmlns:p14="http://schemas.microsoft.com/office/powerpoint/2010/main" val="1024086991"/>
+      </p:ext>
+    </p:extLst>
+  </p:cSld>
+  <p:clrMapOvr>
+    <a:masterClrMapping/>
+  </p:clrMapOvr>
+</p:notes>
+</file>
+
+<file path=ppt/notesSlides/notesSlide4.xml><?xml version="1.0" encoding="utf-8"?>
 <p:notes xmlns:a="http://schemas.openxmlformats.org/drawingml/2006/main" xmlns:r="http://schemas.openxmlformats.org/officeDocument/2006/relationships" xmlns:p="http://schemas.openxmlformats.org/presentationml/2006/main">
   <p:cSld>
     <p:spTree>
@@ -2042,7 +2141,7 @@
           <a:p>
             <a:fld id="{F7021451-1387-4CA6-816F-3879F97B5CBC}" type="slidenum">
               <a:rPr lang="en-US"/>
-              <a:t>5</a:t>
+              <a:t>4</a:t>
             </a:fld>
             <a:endParaRPr lang="en-US"/>
           </a:p>
@@ -2061,7 +2160,184 @@
 </p:notes>
 </file>
 
+<file path=ppt/notesSlides/notesSlide5.xml><?xml version="1.0" encoding="utf-8"?>
+<p:notes xmlns:a="http://schemas.openxmlformats.org/drawingml/2006/main" xmlns:r="http://schemas.openxmlformats.org/officeDocument/2006/relationships" xmlns:p="http://schemas.openxmlformats.org/presentationml/2006/main">
+  <p:cSld>
+    <p:spTree>
+      <p:nvGrpSpPr>
+        <p:cNvPr id="1" name=""/>
+        <p:cNvGrpSpPr/>
+        <p:nvPr/>
+      </p:nvGrpSpPr>
+      <p:grpSpPr>
+        <a:xfrm>
+          <a:off x="0" y="0"/>
+          <a:ext cx="0" cy="0"/>
+          <a:chOff x="0" y="0"/>
+          <a:chExt cx="0" cy="0"/>
+        </a:xfrm>
+      </p:grpSpPr>
+      <p:sp>
+        <p:nvSpPr>
+          <p:cNvPr id="2" name="Slide Image Placeholder 1"/>
+          <p:cNvSpPr>
+            <a:spLocks noGrp="1" noRot="1" noChangeAspect="1"/>
+          </p:cNvSpPr>
+          <p:nvPr>
+            <p:ph type="sldImg"/>
+          </p:nvPr>
+        </p:nvSpPr>
+        <p:spPr/>
+      </p:sp>
+      <p:sp>
+        <p:nvSpPr>
+          <p:cNvPr id="3" name="Notes Placeholder 2"/>
+          <p:cNvSpPr>
+            <a:spLocks noGrp="1"/>
+          </p:cNvSpPr>
+          <p:nvPr>
+            <p:ph type="body" idx="1"/>
+          </p:nvPr>
+        </p:nvSpPr>
+        <p:spPr/>
+        <p:txBody>
+          <a:bodyPr/>
+          <a:lstStyle/>
+          <a:p>
+            <a:r>
+              <a:rPr lang="en-US" dirty="0"/>
+              <a:t>行と列、両者を指定すれば単一の値が得られるし、列を指定すれば縦のベクトルが得られるし、列を指定すれば〜と色々ありますが、
+どこのセルを選択していて、それに対してどういう操作しているのかイメージしながら使えるようになるととてもよきです</a:t>
+            </a:r>
+            <a:endParaRPr lang="en-US" dirty="0"/>
+          </a:p>
+        </p:txBody>
+      </p:sp>
+      <p:sp>
+        <p:nvSpPr>
+          <p:cNvPr id="4" name="Slide Number Placeholder 3"/>
+          <p:cNvSpPr>
+            <a:spLocks noGrp="1"/>
+          </p:cNvSpPr>
+          <p:nvPr>
+            <p:ph type="sldNum" sz="quarter" idx="10"/>
+          </p:nvPr>
+        </p:nvSpPr>
+        <p:spPr/>
+        <p:txBody>
+          <a:bodyPr/>
+          <a:lstStyle/>
+          <a:p>
+            <a:fld id="{F7021451-1387-4CA6-816F-3879F97B5CBC}" type="slidenum">
+              <a:rPr lang="en-US"/>
+              <a:t>5</a:t>
+            </a:fld>
+            <a:endParaRPr lang="en-US"/>
+          </a:p>
+        </p:txBody>
+      </p:sp>
+    </p:spTree>
+    <p:extLst>
+      <p:ext uri="{BB962C8B-B14F-4D97-AF65-F5344CB8AC3E}">
+        <p14:creationId xmlns:p14="http://schemas.microsoft.com/office/powerpoint/2010/main" val="1024086991"/>
+      </p:ext>
+    </p:extLst>
+  </p:cSld>
+  <p:clrMapOvr>
+    <a:masterClrMapping/>
+  </p:clrMapOvr>
+</p:notes>
+</file>
+
 <file path=ppt/notesSlides/notesSlide6.xml><?xml version="1.0" encoding="utf-8"?>
+<p:notes xmlns:a="http://schemas.openxmlformats.org/drawingml/2006/main" xmlns:r="http://schemas.openxmlformats.org/officeDocument/2006/relationships" xmlns:p="http://schemas.openxmlformats.org/presentationml/2006/main">
+  <p:cSld>
+    <p:spTree>
+      <p:nvGrpSpPr>
+        <p:cNvPr id="1" name=""/>
+        <p:cNvGrpSpPr/>
+        <p:nvPr/>
+      </p:nvGrpSpPr>
+      <p:grpSpPr>
+        <a:xfrm>
+          <a:off x="0" y="0"/>
+          <a:ext cx="0" cy="0"/>
+          <a:chOff x="0" y="0"/>
+          <a:chExt cx="0" cy="0"/>
+        </a:xfrm>
+      </p:grpSpPr>
+      <p:sp>
+        <p:nvSpPr>
+          <p:cNvPr id="2" name="Slide Image Placeholder 1"/>
+          <p:cNvSpPr>
+            <a:spLocks noGrp="1" noRot="1" noChangeAspect="1"/>
+          </p:cNvSpPr>
+          <p:nvPr>
+            <p:ph type="sldImg"/>
+          </p:nvPr>
+        </p:nvSpPr>
+        <p:spPr/>
+      </p:sp>
+      <p:sp>
+        <p:nvSpPr>
+          <p:cNvPr id="3" name="Notes Placeholder 2"/>
+          <p:cNvSpPr>
+            <a:spLocks noGrp="1"/>
+          </p:cNvSpPr>
+          <p:nvPr>
+            <p:ph type="body" idx="1"/>
+          </p:nvPr>
+        </p:nvSpPr>
+        <p:spPr/>
+        <p:txBody>
+          <a:bodyPr/>
+          <a:lstStyle/>
+          <a:p>
+            <a:r>
+              <a:rPr lang="en-US" dirty="0"/>
+              <a:t>特段説明する必要もありませんが、read_某やto_某という形で読み込んだり書き込んだりします。</a:t>
+            </a:r>
+            <a:endParaRPr lang="en-US" dirty="0"/>
+          </a:p>
+        </p:txBody>
+      </p:sp>
+      <p:sp>
+        <p:nvSpPr>
+          <p:cNvPr id="4" name="Slide Number Placeholder 3"/>
+          <p:cNvSpPr>
+            <a:spLocks noGrp="1"/>
+          </p:cNvSpPr>
+          <p:nvPr>
+            <p:ph type="sldNum" sz="quarter" idx="10"/>
+          </p:nvPr>
+        </p:nvSpPr>
+        <p:spPr/>
+        <p:txBody>
+          <a:bodyPr/>
+          <a:lstStyle/>
+          <a:p>
+            <a:fld id="{F7021451-1387-4CA6-816F-3879F97B5CBC}" type="slidenum">
+              <a:rPr lang="en-US"/>
+              <a:t>6</a:t>
+            </a:fld>
+            <a:endParaRPr lang="en-US"/>
+          </a:p>
+        </p:txBody>
+      </p:sp>
+    </p:spTree>
+    <p:extLst>
+      <p:ext uri="{BB962C8B-B14F-4D97-AF65-F5344CB8AC3E}">
+        <p14:creationId xmlns:p14="http://schemas.microsoft.com/office/powerpoint/2010/main" val="1024086991"/>
+      </p:ext>
+    </p:extLst>
+  </p:cSld>
+  <p:clrMapOvr>
+    <a:masterClrMapping/>
+  </p:clrMapOvr>
+</p:notes>
+</file>
+
+<file path=ppt/notesSlides/notesSlide7.xml><?xml version="1.0" encoding="utf-8"?>
 <p:notes xmlns:a="http://schemas.openxmlformats.org/drawingml/2006/main" xmlns:r="http://schemas.openxmlformats.org/officeDocument/2006/relationships" xmlns:p="http://schemas.openxmlformats.org/presentationml/2006/main">
   <p:cSld>
     <p:spTree>
@@ -2130,7 +2406,7 @@
           <a:p>
             <a:fld id="{F7021451-1387-4CA6-816F-3879F97B5CBC}" type="slidenum">
               <a:rPr lang="en-US"/>
-              <a:t>6</a:t>
+              <a:t>7</a:t>
             </a:fld>
             <a:endParaRPr lang="en-US"/>
           </a:p>
@@ -2149,7 +2425,7 @@
 </p:notes>
 </file>
 
-<file path=ppt/notesSlides/notesSlide7.xml><?xml version="1.0" encoding="utf-8"?>
+<file path=ppt/notesSlides/notesSlide8.xml><?xml version="1.0" encoding="utf-8"?>
 <p:notes xmlns:a="http://schemas.openxmlformats.org/drawingml/2006/main" xmlns:r="http://schemas.openxmlformats.org/officeDocument/2006/relationships" xmlns:p="http://schemas.openxmlformats.org/presentationml/2006/main">
   <p:cSld>
     <p:spTree>
@@ -2218,7 +2494,7 @@
           <a:p>
             <a:fld id="{F7021451-1387-4CA6-816F-3879F97B5CBC}" type="slidenum">
               <a:rPr lang="en-US"/>
-              <a:t>7</a:t>
+              <a:t>8</a:t>
             </a:fld>
             <a:endParaRPr lang="en-US"/>
           </a:p>
@@ -2237,94 +2513,6 @@
 </p:notes>
 </file>
 
-<file path=ppt/notesSlides/notesSlide8.xml><?xml version="1.0" encoding="utf-8"?>
-<p:notes xmlns:a="http://schemas.openxmlformats.org/drawingml/2006/main" xmlns:r="http://schemas.openxmlformats.org/officeDocument/2006/relationships" xmlns:p="http://schemas.openxmlformats.org/presentationml/2006/main">
-  <p:cSld>
-    <p:spTree>
-      <p:nvGrpSpPr>
-        <p:cNvPr id="1" name=""/>
-        <p:cNvGrpSpPr/>
-        <p:nvPr/>
-      </p:nvGrpSpPr>
-      <p:grpSpPr>
-        <a:xfrm>
-          <a:off x="0" y="0"/>
-          <a:ext cx="0" cy="0"/>
-          <a:chOff x="0" y="0"/>
-          <a:chExt cx="0" cy="0"/>
-        </a:xfrm>
-      </p:grpSpPr>
-      <p:sp>
-        <p:nvSpPr>
-          <p:cNvPr id="2" name="Slide Image Placeholder 1"/>
-          <p:cNvSpPr>
-            <a:spLocks noGrp="1" noRot="1" noChangeAspect="1"/>
-          </p:cNvSpPr>
-          <p:nvPr>
-            <p:ph type="sldImg"/>
-          </p:nvPr>
-        </p:nvSpPr>
-        <p:spPr/>
-      </p:sp>
-      <p:sp>
-        <p:nvSpPr>
-          <p:cNvPr id="3" name="Notes Placeholder 2"/>
-          <p:cNvSpPr>
-            <a:spLocks noGrp="1"/>
-          </p:cNvSpPr>
-          <p:nvPr>
-            <p:ph type="body" idx="1"/>
-          </p:nvPr>
-        </p:nvSpPr>
-        <p:spPr/>
-        <p:txBody>
-          <a:bodyPr/>
-          <a:lstStyle/>
-          <a:p>
-            <a:r>
-              <a:rPr lang="en-US" dirty="0"/>
-              <a:t/>
-            </a:r>
-            <a:endParaRPr lang="en-US" dirty="0"/>
-          </a:p>
-        </p:txBody>
-      </p:sp>
-      <p:sp>
-        <p:nvSpPr>
-          <p:cNvPr id="4" name="Slide Number Placeholder 3"/>
-          <p:cNvSpPr>
-            <a:spLocks noGrp="1"/>
-          </p:cNvSpPr>
-          <p:nvPr>
-            <p:ph type="sldNum" sz="quarter" idx="10"/>
-          </p:nvPr>
-        </p:nvSpPr>
-        <p:spPr/>
-        <p:txBody>
-          <a:bodyPr/>
-          <a:lstStyle/>
-          <a:p>
-            <a:fld id="{F7021451-1387-4CA6-816F-3879F97B5CBC}" type="slidenum">
-              <a:rPr lang="en-US"/>
-              <a:t>8</a:t>
-            </a:fld>
-            <a:endParaRPr lang="en-US"/>
-          </a:p>
-        </p:txBody>
-      </p:sp>
-    </p:spTree>
-    <p:extLst>
-      <p:ext uri="{BB962C8B-B14F-4D97-AF65-F5344CB8AC3E}">
-        <p14:creationId xmlns:p14="http://schemas.microsoft.com/office/powerpoint/2010/main" val="1024086991"/>
-      </p:ext>
-    </p:extLst>
-  </p:cSld>
-  <p:clrMapOvr>
-    <a:masterClrMapping/>
-  </p:clrMapOvr>
-</p:notes>
-</file>
-
 <file path=ppt/notesSlides/notesSlide9.xml><?xml version="1.0" encoding="utf-8"?>
 <p:notes xmlns:a="http://schemas.openxmlformats.org/drawingml/2006/main" xmlns:r="http://schemas.openxmlformats.org/officeDocument/2006/relationships" xmlns:p="http://schemas.openxmlformats.org/presentationml/2006/main">
   <p:cSld>
@@ -2371,7 +2559,8 @@
           <a:p>
             <a:r>
               <a:rPr lang="en-US" dirty="0"/>
-              <a:t/>
+              <a:t>これを見て取れる通り、表現の違いはあれど、中身は一緒です。
+だから表を頭に作りましょう。</a:t>
             </a:r>
             <a:endParaRPr lang="en-US" dirty="0"/>
           </a:p>
@@ -3269,6 +3458,84 @@
 <file path=ppt/slides/slide22.xml><?xml version="1.0" encoding="utf-8"?>
 <p:sld xmlns:a="http://schemas.openxmlformats.org/drawingml/2006/main" xmlns:r="http://schemas.openxmlformats.org/officeDocument/2006/relationships" xmlns:p="http://schemas.openxmlformats.org/presentationml/2006/main">
   <p:cSld name="Slide 22">
+    <p:bg>
+      <p:bgPr>
+        <a:blipFill dpi="0" rotWithShape="1">
+          <a:blip r:embed="rId1">
+            <a:lum/>
+          </a:blip>
+          <a:srcRect/>
+          <a:stretch>
+            <a:fillRect/>
+          </a:stretch>
+        </a:blipFill>
+        <a:effectLst/>
+      </p:bgPr>
+    </p:bg>
+    <p:spTree>
+      <p:nvGrpSpPr>
+        <p:cNvPr id="1" name=""/>
+        <p:cNvGrpSpPr/>
+        <p:nvPr/>
+      </p:nvGrpSpPr>
+      <p:grpSpPr>
+        <a:xfrm>
+          <a:off x="0" y="0"/>
+          <a:ext cx="0" cy="0"/>
+          <a:chOff x="0" y="0"/>
+          <a:chExt cx="0" cy="0"/>
+        </a:xfrm>
+      </p:grpSpPr>
+    </p:spTree>
+  </p:cSld>
+  <p:clrMapOvr>
+    <a:masterClrMapping/>
+  </p:clrMapOvr>
+</p:sld>
+</file>
+
+<file path=ppt/slides/slide23.xml><?xml version="1.0" encoding="utf-8"?>
+<p:sld xmlns:a="http://schemas.openxmlformats.org/drawingml/2006/main" xmlns:r="http://schemas.openxmlformats.org/officeDocument/2006/relationships" xmlns:p="http://schemas.openxmlformats.org/presentationml/2006/main">
+  <p:cSld name="Slide 23">
+    <p:bg>
+      <p:bgPr>
+        <a:blipFill dpi="0" rotWithShape="1">
+          <a:blip r:embed="rId1">
+            <a:lum/>
+          </a:blip>
+          <a:srcRect/>
+          <a:stretch>
+            <a:fillRect/>
+          </a:stretch>
+        </a:blipFill>
+        <a:effectLst/>
+      </p:bgPr>
+    </p:bg>
+    <p:spTree>
+      <p:nvGrpSpPr>
+        <p:cNvPr id="1" name=""/>
+        <p:cNvGrpSpPr/>
+        <p:nvPr/>
+      </p:nvGrpSpPr>
+      <p:grpSpPr>
+        <a:xfrm>
+          <a:off x="0" y="0"/>
+          <a:ext cx="0" cy="0"/>
+          <a:chOff x="0" y="0"/>
+          <a:chExt cx="0" cy="0"/>
+        </a:xfrm>
+      </p:grpSpPr>
+    </p:spTree>
+  </p:cSld>
+  <p:clrMapOvr>
+    <a:masterClrMapping/>
+  </p:clrMapOvr>
+</p:sld>
+</file>
+
+<file path=ppt/slides/slide24.xml><?xml version="1.0" encoding="utf-8"?>
+<p:sld xmlns:a="http://schemas.openxmlformats.org/drawingml/2006/main" xmlns:r="http://schemas.openxmlformats.org/officeDocument/2006/relationships" xmlns:p="http://schemas.openxmlformats.org/presentationml/2006/main">
+  <p:cSld name="Slide 24">
     <p:bg>
       <p:bgPr>
         <a:blipFill dpi="0" rotWithShape="1">

</xml_diff>